<commit_message>
Atualização BD e planilhas
</commit_message>
<xml_diff>
--- a/ppt/DataCenter.pptx
+++ b/ppt/DataCenter.pptx
@@ -115,6 +115,11 @@
       </a:defRPr>
     </a:lvl9pPr>
   </p:defaultTextStyle>
+  <p:extLst>
+    <p:ext uri="{EFAFB233-063F-42B5-8137-9DF3F51BA10A}">
+      <p15:sldGuideLst xmlns:p15="http://schemas.microsoft.com/office/powerpoint/2012/main"/>
+    </p:ext>
+  </p:extLst>
 </p:presentation>
 </file>
 
@@ -896,7 +901,7 @@
         <p:spPr>
           <a:xfrm>
             <a:off x="1143000" y="685800"/>
-            <a:ext cx="4571280" cy="3428280"/>
+            <a:ext cx="4572000" cy="3429000"/>
           </a:xfrm>
           <a:prstGeom prst="rect">
             <a:avLst/>
@@ -1148,7 +1153,7 @@
         <p:spPr>
           <a:xfrm>
             <a:off x="1143000" y="685800"/>
-            <a:ext cx="4571280" cy="3428280"/>
+            <a:ext cx="4572000" cy="3429000"/>
           </a:xfrm>
           <a:prstGeom prst="rect">
             <a:avLst/>
@@ -5534,8 +5539,8 @@
         </p:nvSpPr>
         <p:spPr>
           <a:xfrm>
-            <a:off x="2363373" y="3069000"/>
-            <a:ext cx="1519311" cy="1600438"/>
+            <a:off x="2363373" y="3097136"/>
+            <a:ext cx="1744393" cy="1292662"/>
           </a:xfrm>
           <a:prstGeom prst="rect">
             <a:avLst/>
@@ -6329,7 +6334,7 @@
                 <a:spcPts val="400"/>
               </a:spcBef>
             </a:pPr>
-            <a:endParaRPr lang="pt-BR" sz="1800" b="0" strike="noStrike" spc="-1">
+            <a:endParaRPr lang="pt-BR" sz="1800" b="0" strike="noStrike" spc="-1" dirty="0">
               <a:latin typeface="Arial"/>
             </a:endParaRPr>
           </a:p>
@@ -6348,16 +6353,16 @@
               <a:buChar char=""/>
             </a:pPr>
             <a:r>
-              <a:rPr lang="pt-BR" sz="2000" b="0" strike="noStrike" spc="-1">
+              <a:rPr lang="pt-BR" sz="2000" b="0" strike="noStrike" spc="-1" dirty="0">
                 <a:solidFill>
                   <a:srgbClr val="FFFFFF"/>
                 </a:solidFill>
                 <a:latin typeface="Calibri"/>
                 <a:ea typeface="굴림"/>
               </a:rPr>
-              <a:t>Um estudo informa que os servidores de um Data Center gastam, em média, 850 watts por hora. Multiplicado por 24 horas equivale a 20.400 Watts diários, ou 20.4 kilowatts (kWh). Multiplique isso por 30 dias para chegar a 612 kWh mensais. Sabendo-se que um kwh  é igual a R$ 0,80 em tarifa comercial na região de São Paulo o valor de uma conta seria de R$ 489,60.</a:t>
+              <a:t>Um estudo informa que os servidores de um Data Center gastam, em média, 850 watts por hora. Em um dia se consome 20.4 kilowatt/hora (kWh). Multiplique isso por 30 dias para chegar a 612 kWh mensais. Sabendo-se que um kwh  é igual a R$ 0,80 em tarifa comercial na região de São Paulo o valor de uma conta seria de R$ 489,60.</a:t>
             </a:r>
-            <a:endParaRPr lang="pt-BR" sz="2000" b="0" strike="noStrike" spc="-1">
+            <a:endParaRPr lang="pt-BR" sz="2000" b="0" strike="noStrike" spc="-1" dirty="0">
               <a:latin typeface="Arial"/>
             </a:endParaRPr>
           </a:p>
@@ -6370,7 +6375,7 @@
                 <a:spcPts val="400"/>
               </a:spcBef>
             </a:pPr>
-            <a:endParaRPr lang="pt-BR" sz="2000" b="0" strike="noStrike" spc="-1">
+            <a:endParaRPr lang="pt-BR" sz="2000" b="0" strike="noStrike" spc="-1" dirty="0">
               <a:latin typeface="Arial"/>
             </a:endParaRPr>
           </a:p>
@@ -6389,7 +6394,7 @@
               <a:buChar char=""/>
             </a:pPr>
             <a:r>
-              <a:rPr lang="pt-BR" sz="2000" b="0" strike="noStrike" spc="-1">
+              <a:rPr lang="pt-BR" sz="2000" b="0" strike="noStrike" spc="-1" dirty="0">
                 <a:solidFill>
                   <a:srgbClr val="FFFFFF"/>
                 </a:solidFill>
@@ -6398,7 +6403,7 @@
               </a:rPr>
               <a:t> Um aparelho de ar condicionado com uma potência de 1.580 Watts hora (a potência média de referência) multiplicado por 24 equivale a 37.920 watts diários, ou 37.9 kilowatts (kWh). Multiplique isso por 30 dias para chegar a 1137 kWh mensais o total seria de R$ 909,60 por mês. </a:t>
             </a:r>
-            <a:endParaRPr lang="pt-BR" sz="2000" b="0" strike="noStrike" spc="-1">
+            <a:endParaRPr lang="pt-BR" sz="2000" b="0" strike="noStrike" spc="-1" dirty="0">
               <a:latin typeface="Arial"/>
             </a:endParaRPr>
           </a:p>
@@ -6411,7 +6416,7 @@
                 <a:spcPts val="400"/>
               </a:spcBef>
             </a:pPr>
-            <a:endParaRPr lang="pt-BR" sz="2000" b="0" strike="noStrike" spc="-1">
+            <a:endParaRPr lang="pt-BR" sz="2000" b="0" strike="noStrike" spc="-1" dirty="0">
               <a:latin typeface="Arial"/>
             </a:endParaRPr>
           </a:p>
@@ -6430,7 +6435,7 @@
               <a:buChar char=""/>
             </a:pPr>
             <a:r>
-              <a:rPr lang="pt-BR" sz="2000" b="0" strike="noStrike" spc="-1">
+              <a:rPr lang="pt-BR" sz="2000" b="0" strike="noStrike" spc="-1" dirty="0">
                 <a:solidFill>
                   <a:srgbClr val="FFFFFF"/>
                 </a:solidFill>
@@ -6439,7 +6444,7 @@
               </a:rPr>
               <a:t>Então ao todo apenas na região onde está o data Center (considerando apenas o data Center e o ar condicionado) seria um total de aproximadamente R$ 1400,00.</a:t>
             </a:r>
-            <a:endParaRPr lang="pt-BR" sz="2000" b="0" strike="noStrike" spc="-1">
+            <a:endParaRPr lang="pt-BR" sz="2000" b="0" strike="noStrike" spc="-1" dirty="0">
               <a:latin typeface="Arial"/>
             </a:endParaRPr>
           </a:p>
@@ -6707,7 +6712,7 @@
                 <a:latin typeface="Calibri"/>
                 <a:ea typeface="Calibri"/>
               </a:rPr>
-              <a:t>Aumentar a eficiência dos ventiladores </a:t>
+              <a:t>Aumentar a eficiência dos ventiladores</a:t>
             </a:r>
             <a:r>
               <a:rPr lang="pt-BR" sz="2000" b="0" strike="noStrike" spc="-1" dirty="0">
@@ -6717,7 +6722,7 @@
                 <a:latin typeface="Calibri"/>
                 <a:ea typeface="Times New Roman"/>
               </a:rPr>
-              <a:t>dores de Precisão: </a:t>
+              <a:t> de Precisão: </a:t>
             </a:r>
             <a:r>
               <a:rPr lang="pt-BR" sz="1800" b="0" strike="noStrike" spc="-1" dirty="0">
@@ -6727,7 +6732,7 @@
                 <a:latin typeface="Calibri"/>
                 <a:ea typeface="Times New Roman"/>
               </a:rPr>
-              <a:t>mantêm a umidade e o resfriamento necessário por metro </a:t>
+              <a:t>mantêm a umidade e o resfriamento necessário por metro, </a:t>
             </a:r>
             <a:r>
               <a:rPr lang="pt-BR" sz="2000" b="0" strike="noStrike" spc="-1" dirty="0">
@@ -6737,7 +6742,7 @@
                 <a:latin typeface="Calibri"/>
                 <a:ea typeface="Calibri"/>
               </a:rPr>
-              <a:t>acrescentando uma frequência variável para os mesmos diminuindo sua velocidade e no uso de energia. </a:t>
+              <a:t>acrescentando uma frequência variável para os mesmos, diminuindo sua velocidade e o uso de energia. </a:t>
             </a:r>
             <a:endParaRPr lang="pt-BR" sz="2000" b="0" strike="noStrike" spc="-1" dirty="0">
               <a:latin typeface="Arial"/>
@@ -6927,7 +6932,7 @@
                 <a:spcPts val="479"/>
               </a:spcBef>
             </a:pPr>
-            <a:endParaRPr lang="pt-BR" sz="1800" b="0" strike="noStrike" spc="-1">
+            <a:endParaRPr lang="pt-BR" sz="1800" b="0" strike="noStrike" spc="-1" dirty="0">
               <a:latin typeface="Arial"/>
             </a:endParaRPr>
           </a:p>
@@ -6946,7 +6951,7 @@
               <a:buChar char=""/>
             </a:pPr>
             <a:r>
-              <a:rPr lang="pt-BR" sz="2000" b="0" u="sng" strike="noStrike" spc="-1">
+              <a:rPr lang="pt-BR" sz="2000" b="0" u="sng" strike="noStrike" spc="-1" dirty="0">
                 <a:solidFill>
                   <a:srgbClr val="FFFFFF"/>
                 </a:solidFill>
@@ -6956,7 +6961,7 @@
               </a:rPr>
               <a:t>Ideia</a:t>
             </a:r>
-            <a:endParaRPr lang="pt-BR" sz="2000" b="0" strike="noStrike" spc="-1">
+            <a:endParaRPr lang="pt-BR" sz="2000" b="0" strike="noStrike" spc="-1" dirty="0">
               <a:latin typeface="Arial"/>
             </a:endParaRPr>
           </a:p>
@@ -6970,16 +6975,56 @@
               </a:spcBef>
             </a:pPr>
             <a:r>
-              <a:rPr lang="pt-BR" sz="2000" b="0" strike="noStrike" spc="-1">
+              <a:rPr lang="pt-BR" sz="2000" b="0" strike="noStrike" spc="-1" dirty="0">
                 <a:solidFill>
                   <a:srgbClr val="FFFFFF"/>
                 </a:solidFill>
                 <a:latin typeface="Calibri"/>
                 <a:ea typeface="굴림"/>
               </a:rPr>
-              <a:t>O nosso projeto será baseado em uma API que monitore e controle equipamentos de refrigeração e umidificação (ligue e deligue os equipamentos mantendo a temperatura e umidade ideal), faça armazenamento de dados e quando necessário crie e envie alertas para os usuários responsáveis.</a:t>
+              <a:t>O nosso projeto será baseado em uma API que monitore </a:t>
             </a:r>
-            <a:endParaRPr lang="pt-BR" sz="2000" b="0" strike="noStrike" spc="-1">
+            <a:r>
+              <a:rPr lang="pt-BR" sz="2000" spc="-1" dirty="0">
+                <a:solidFill>
+                  <a:srgbClr val="FFFFFF"/>
+                </a:solidFill>
+                <a:latin typeface="Calibri"/>
+                <a:ea typeface="굴림"/>
+              </a:rPr>
+              <a:t> os </a:t>
+            </a:r>
+            <a:r>
+              <a:rPr lang="pt-BR" sz="2000" b="0" strike="noStrike" spc="-1" dirty="0">
+                <a:solidFill>
+                  <a:srgbClr val="FFFFFF"/>
+                </a:solidFill>
+                <a:latin typeface="Calibri"/>
+                <a:ea typeface="굴림"/>
+              </a:rPr>
+              <a:t>equipamentos de refrigeração e umidificação (</a:t>
+            </a:r>
+            <a:r>
+              <a:rPr lang="pt-BR" sz="2000" spc="-1" dirty="0">
+                <a:solidFill>
+                  <a:srgbClr val="FFFFFF"/>
+                </a:solidFill>
+                <a:latin typeface="Calibri"/>
+                <a:ea typeface="굴림"/>
+              </a:rPr>
+              <a:t>controlando</a:t>
+            </a:r>
+            <a:r>
+              <a:rPr lang="pt-BR" sz="2000" b="0" strike="noStrike" spc="-1" dirty="0">
+                <a:solidFill>
+                  <a:srgbClr val="FFFFFF"/>
+                </a:solidFill>
+                <a:latin typeface="Calibri"/>
+                <a:ea typeface="굴림"/>
+              </a:rPr>
+              <a:t> os equipamentos mantendo a temperatura e umidade ideal), faça armazenamento de dados e quando necessário crie e envie alertas para os usuários responsáveis.</a:t>
+            </a:r>
+            <a:endParaRPr lang="pt-BR" sz="2000" b="0" strike="noStrike" spc="-1" dirty="0">
               <a:latin typeface="Arial"/>
             </a:endParaRPr>
           </a:p>
@@ -6992,7 +7037,7 @@
                 <a:spcPts val="400"/>
               </a:spcBef>
             </a:pPr>
-            <a:endParaRPr lang="pt-BR" sz="2000" b="0" strike="noStrike" spc="-1">
+            <a:endParaRPr lang="pt-BR" sz="2000" b="0" strike="noStrike" spc="-1" dirty="0">
               <a:latin typeface="Arial"/>
             </a:endParaRPr>
           </a:p>
@@ -7011,7 +7056,7 @@
               <a:buChar char=""/>
             </a:pPr>
             <a:r>
-              <a:rPr lang="pt-BR" sz="2000" b="0" u="sng" strike="noStrike" spc="-1">
+              <a:rPr lang="pt-BR" sz="2000" b="0" u="sng" strike="noStrike" spc="-1" dirty="0">
                 <a:solidFill>
                   <a:srgbClr val="FFFFFF"/>
                 </a:solidFill>
@@ -7021,7 +7066,7 @@
               </a:rPr>
               <a:t>Nosso projeto x mercado atual</a:t>
             </a:r>
-            <a:endParaRPr lang="pt-BR" sz="2000" b="0" strike="noStrike" spc="-1">
+            <a:endParaRPr lang="pt-BR" sz="2000" b="0" strike="noStrike" spc="-1" dirty="0">
               <a:latin typeface="Arial"/>
             </a:endParaRPr>
           </a:p>
@@ -7035,16 +7080,16 @@
               </a:spcBef>
             </a:pPr>
             <a:r>
-              <a:rPr lang="pt-BR" sz="2000" b="0" strike="noStrike" spc="-1">
+              <a:rPr lang="pt-BR" sz="2000" b="0" strike="noStrike" spc="-1" dirty="0">
                 <a:solidFill>
                   <a:srgbClr val="FFFFFF"/>
                 </a:solidFill>
                 <a:latin typeface="Calibri"/>
                 <a:ea typeface="굴림"/>
               </a:rPr>
-              <a:t>O que nos diferencia das APIS que já estão no mercado é que com a atualização real time, teremos maior confiabilidade nos resultados e na manutenção, pois ainda fazem manualmente e esses relatórios não são confiáveis.Desenvolvendo assim a tecnologia e a automação do monitoramento e controle de temperatura e umidade, para melhor eficiência energética que acabará ocasionado em uma grande economia no custo da energia elétrica pois os aparelhos estarão programados para ligarem apenas quando necessário. </a:t>
+              <a:t>O que nos diferencia das APIS que já estão no mercado é que com a atualização real time, teremos maior confiabilidade nos resultados e na manutenção, pois ainda fazem manualmente e esses relatórios não são confiáveis. Desenvolvendo assim a tecnologia e a automação do monitoramento e controle de temperatura e umidade, para melhor eficiência energética que acabará ocasionado em uma grande economia no custo da energia elétrica pois os aparelhos estarão programados para ligarem apenas quando necessário. </a:t>
             </a:r>
-            <a:endParaRPr lang="pt-BR" sz="2000" b="0" strike="noStrike" spc="-1">
+            <a:endParaRPr lang="pt-BR" sz="2000" b="0" strike="noStrike" spc="-1" dirty="0">
               <a:latin typeface="Arial"/>
             </a:endParaRPr>
           </a:p>
@@ -7057,7 +7102,7 @@
                 <a:spcPts val="561"/>
               </a:spcBef>
             </a:pPr>
-            <a:endParaRPr lang="pt-BR" sz="2000" b="0" strike="noStrike" spc="-1">
+            <a:endParaRPr lang="pt-BR" sz="2000" b="0" strike="noStrike" spc="-1" dirty="0">
               <a:latin typeface="Arial"/>
             </a:endParaRPr>
           </a:p>
@@ -7070,7 +7115,7 @@
                 <a:spcPts val="561"/>
               </a:spcBef>
             </a:pPr>
-            <a:endParaRPr lang="pt-BR" sz="2000" b="0" strike="noStrike" spc="-1">
+            <a:endParaRPr lang="pt-BR" sz="2000" b="0" strike="noStrike" spc="-1" dirty="0">
               <a:latin typeface="Arial"/>
             </a:endParaRPr>
           </a:p>

</xml_diff>